<commit_message>
editing figures for NL rather than CFE
</commit_message>
<xml_diff>
--- a/ModelFigure_revised.pptx
+++ b/ModelFigure_revised.pptx
@@ -243,7 +243,7 @@
           <a:p>
             <a:fld id="{07694B51-7E4A-9249-B936-B67EAFC3119C}" type="datetimeFigureOut">
               <a:rPr lang="en-US" smtClean="0"/>
-              <a:t>5/2/21</a:t>
+              <a:t>5/4/21</a:t>
             </a:fld>
             <a:endParaRPr lang="en-US"/>
           </a:p>
@@ -413,7 +413,7 @@
           <a:p>
             <a:fld id="{07694B51-7E4A-9249-B936-B67EAFC3119C}" type="datetimeFigureOut">
               <a:rPr lang="en-US" smtClean="0"/>
-              <a:t>5/2/21</a:t>
+              <a:t>5/4/21</a:t>
             </a:fld>
             <a:endParaRPr lang="en-US"/>
           </a:p>
@@ -593,7 +593,7 @@
           <a:p>
             <a:fld id="{07694B51-7E4A-9249-B936-B67EAFC3119C}" type="datetimeFigureOut">
               <a:rPr lang="en-US" smtClean="0"/>
-              <a:t>5/2/21</a:t>
+              <a:t>5/4/21</a:t>
             </a:fld>
             <a:endParaRPr lang="en-US"/>
           </a:p>
@@ -763,7 +763,7 @@
           <a:p>
             <a:fld id="{07694B51-7E4A-9249-B936-B67EAFC3119C}" type="datetimeFigureOut">
               <a:rPr lang="en-US" smtClean="0"/>
-              <a:t>5/2/21</a:t>
+              <a:t>5/4/21</a:t>
             </a:fld>
             <a:endParaRPr lang="en-US"/>
           </a:p>
@@ -1007,7 +1007,7 @@
           <a:p>
             <a:fld id="{07694B51-7E4A-9249-B936-B67EAFC3119C}" type="datetimeFigureOut">
               <a:rPr lang="en-US" smtClean="0"/>
-              <a:t>5/2/21</a:t>
+              <a:t>5/4/21</a:t>
             </a:fld>
             <a:endParaRPr lang="en-US"/>
           </a:p>
@@ -1239,7 +1239,7 @@
           <a:p>
             <a:fld id="{07694B51-7E4A-9249-B936-B67EAFC3119C}" type="datetimeFigureOut">
               <a:rPr lang="en-US" smtClean="0"/>
-              <a:t>5/2/21</a:t>
+              <a:t>5/4/21</a:t>
             </a:fld>
             <a:endParaRPr lang="en-US"/>
           </a:p>
@@ -1606,7 +1606,7 @@
           <a:p>
             <a:fld id="{07694B51-7E4A-9249-B936-B67EAFC3119C}" type="datetimeFigureOut">
               <a:rPr lang="en-US" smtClean="0"/>
-              <a:t>5/2/21</a:t>
+              <a:t>5/4/21</a:t>
             </a:fld>
             <a:endParaRPr lang="en-US"/>
           </a:p>
@@ -1724,7 +1724,7 @@
           <a:p>
             <a:fld id="{07694B51-7E4A-9249-B936-B67EAFC3119C}" type="datetimeFigureOut">
               <a:rPr lang="en-US" smtClean="0"/>
-              <a:t>5/2/21</a:t>
+              <a:t>5/4/21</a:t>
             </a:fld>
             <a:endParaRPr lang="en-US"/>
           </a:p>
@@ -1819,7 +1819,7 @@
           <a:p>
             <a:fld id="{07694B51-7E4A-9249-B936-B67EAFC3119C}" type="datetimeFigureOut">
               <a:rPr lang="en-US" smtClean="0"/>
-              <a:t>5/2/21</a:t>
+              <a:t>5/4/21</a:t>
             </a:fld>
             <a:endParaRPr lang="en-US"/>
           </a:p>
@@ -2096,7 +2096,7 @@
           <a:p>
             <a:fld id="{07694B51-7E4A-9249-B936-B67EAFC3119C}" type="datetimeFigureOut">
               <a:rPr lang="en-US" smtClean="0"/>
-              <a:t>5/2/21</a:t>
+              <a:t>5/4/21</a:t>
             </a:fld>
             <a:endParaRPr lang="en-US"/>
           </a:p>
@@ -2353,7 +2353,7 @@
           <a:p>
             <a:fld id="{07694B51-7E4A-9249-B936-B67EAFC3119C}" type="datetimeFigureOut">
               <a:rPr lang="en-US" smtClean="0"/>
-              <a:t>5/2/21</a:t>
+              <a:t>5/4/21</a:t>
             </a:fld>
             <a:endParaRPr lang="en-US"/>
           </a:p>
@@ -2566,7 +2566,7 @@
           <a:p>
             <a:fld id="{07694B51-7E4A-9249-B936-B67EAFC3119C}" type="datetimeFigureOut">
               <a:rPr lang="en-US" smtClean="0"/>
-              <a:t>5/2/21</a:t>
+              <a:t>5/4/21</a:t>
             </a:fld>
             <a:endParaRPr lang="en-US"/>
           </a:p>
@@ -4714,8 +4714,8 @@
         </p:nvSpPr>
         <p:spPr>
           <a:xfrm>
-            <a:off x="2037494" y="3309337"/>
-            <a:ext cx="720069" cy="215444"/>
+            <a:off x="2058333" y="3309337"/>
+            <a:ext cx="678391" cy="215444"/>
           </a:xfrm>
           <a:prstGeom prst="rect">
             <a:avLst/>
@@ -4731,7 +4731,7 @@
             <a:pPr algn="ctr"/>
             <a:r>
               <a:rPr lang="en-US" sz="800" dirty="0"/>
-              <a:t>CFE Features</a:t>
+              <a:t>NL Features</a:t>
             </a:r>
           </a:p>
         </p:txBody>

</xml_diff>